<commit_message>
Commit Final v2 Agregado el link del repositorio a la presentacion
</commit_message>
<xml_diff>
--- a/Presentacion/PIVOT-UNPIVOT-LOOKUP.pptx
+++ b/Presentacion/PIVOT-UNPIVOT-LOOKUP.pptx
@@ -5,7 +5,7 @@
     <p:sldMasterId id="2147483763" r:id="rId1"/>
   </p:sldMasterIdLst>
   <p:notesMasterIdLst>
-    <p:notesMasterId r:id="rId9"/>
+    <p:notesMasterId r:id="rId10"/>
   </p:notesMasterIdLst>
   <p:sldIdLst>
     <p:sldId id="256" r:id="rId2"/>
@@ -15,6 +15,7 @@
     <p:sldId id="259" r:id="rId6"/>
     <p:sldId id="260" r:id="rId7"/>
     <p:sldId id="263" r:id="rId8"/>
+    <p:sldId id="264" r:id="rId9"/>
   </p:sldIdLst>
   <p:sldSz cx="12192000" cy="6858000"/>
   <p:notesSz cx="6858000" cy="9144000"/>
@@ -673,7 +674,7 @@
           <a:noFill/>
           <a:extLst>
             <a:ext uri="{909E8E84-426E-40dd-AFC4-6F175D3DCCD1}">
-              <a14:hiddenFill xmlns="" xmlns:a14="http://schemas.microsoft.com/office/drawing/2010/main">
+              <a14:hiddenFill xmlns:a14="http://schemas.microsoft.com/office/drawing/2010/main" xmlns="">
                 <a:solidFill>
                   <a:srgbClr val="FFFFFF"/>
                 </a:solidFill>
@@ -733,7 +734,7 @@
             </a:ln>
             <a:extLst>
               <a:ext uri="{91240B29-F687-4f45-9708-019B960494DF}">
-                <a14:hiddenLine xmlns="" xmlns:a14="http://schemas.microsoft.com/office/drawing/2010/main" w="9525">
+                <a14:hiddenLine xmlns:a14="http://schemas.microsoft.com/office/drawing/2010/main" xmlns="" w="9525">
                   <a:solidFill>
                     <a:srgbClr val="000000"/>
                   </a:solidFill>
@@ -823,7 +824,7 @@
             </a:ln>
             <a:extLst>
               <a:ext uri="{91240B29-F687-4f45-9708-019B960494DF}">
-                <a14:hiddenLine xmlns="" xmlns:a14="http://schemas.microsoft.com/office/drawing/2010/main" w="9525">
+                <a14:hiddenLine xmlns:a14="http://schemas.microsoft.com/office/drawing/2010/main" xmlns="" w="9525">
                   <a:solidFill>
                     <a:srgbClr val="000000"/>
                   </a:solidFill>
@@ -913,7 +914,7 @@
             </a:ln>
             <a:extLst>
               <a:ext uri="{91240B29-F687-4f45-9708-019B960494DF}">
-                <a14:hiddenLine xmlns="" xmlns:a14="http://schemas.microsoft.com/office/drawing/2010/main" w="9525">
+                <a14:hiddenLine xmlns:a14="http://schemas.microsoft.com/office/drawing/2010/main" xmlns="" w="9525">
                   <a:solidFill>
                     <a:srgbClr val="000000"/>
                   </a:solidFill>
@@ -947,7 +948,7 @@
             </a:ln>
             <a:extLst>
               <a:ext uri="{91240B29-F687-4f45-9708-019B960494DF}">
-                <a14:hiddenLine xmlns="" xmlns:a14="http://schemas.microsoft.com/office/drawing/2010/main" w="9525">
+                <a14:hiddenLine xmlns:a14="http://schemas.microsoft.com/office/drawing/2010/main" xmlns="" w="9525">
                   <a:solidFill>
                     <a:srgbClr val="000000"/>
                   </a:solidFill>
@@ -1037,7 +1038,7 @@
             </a:ln>
             <a:extLst>
               <a:ext uri="{91240B29-F687-4f45-9708-019B960494DF}">
-                <a14:hiddenLine xmlns="" xmlns:a14="http://schemas.microsoft.com/office/drawing/2010/main" w="9525">
+                <a14:hiddenLine xmlns:a14="http://schemas.microsoft.com/office/drawing/2010/main" xmlns="" w="9525">
                   <a:solidFill>
                     <a:srgbClr val="000000"/>
                   </a:solidFill>
@@ -1099,7 +1100,7 @@
             </a:ln>
             <a:extLst>
               <a:ext uri="{91240B29-F687-4f45-9708-019B960494DF}">
-                <a14:hiddenLine xmlns="" xmlns:a14="http://schemas.microsoft.com/office/drawing/2010/main" w="9525">
+                <a14:hiddenLine xmlns:a14="http://schemas.microsoft.com/office/drawing/2010/main" xmlns="" w="9525">
                   <a:solidFill>
                     <a:srgbClr val="000000"/>
                   </a:solidFill>
@@ -1161,7 +1162,7 @@
             </a:ln>
             <a:extLst>
               <a:ext uri="{91240B29-F687-4f45-9708-019B960494DF}">
-                <a14:hiddenLine xmlns="" xmlns:a14="http://schemas.microsoft.com/office/drawing/2010/main" w="9525">
+                <a14:hiddenLine xmlns:a14="http://schemas.microsoft.com/office/drawing/2010/main" xmlns="" w="9525">
                   <a:solidFill>
                     <a:srgbClr val="000000"/>
                   </a:solidFill>
@@ -1251,7 +1252,7 @@
             </a:ln>
             <a:extLst>
               <a:ext uri="{91240B29-F687-4f45-9708-019B960494DF}">
-                <a14:hiddenLine xmlns="" xmlns:a14="http://schemas.microsoft.com/office/drawing/2010/main" w="9525">
+                <a14:hiddenLine xmlns:a14="http://schemas.microsoft.com/office/drawing/2010/main" xmlns="" w="9525">
                   <a:solidFill>
                     <a:srgbClr val="000000"/>
                   </a:solidFill>
@@ -1313,7 +1314,7 @@
             </a:ln>
             <a:extLst>
               <a:ext uri="{91240B29-F687-4f45-9708-019B960494DF}">
-                <a14:hiddenLine xmlns="" xmlns:a14="http://schemas.microsoft.com/office/drawing/2010/main" w="9525">
+                <a14:hiddenLine xmlns:a14="http://schemas.microsoft.com/office/drawing/2010/main" xmlns="" w="9525">
                   <a:solidFill>
                     <a:srgbClr val="000000"/>
                   </a:solidFill>
@@ -1375,7 +1376,7 @@
             </a:ln>
             <a:extLst>
               <a:ext uri="{91240B29-F687-4f45-9708-019B960494DF}">
-                <a14:hiddenLine xmlns="" xmlns:a14="http://schemas.microsoft.com/office/drawing/2010/main" w="9525">
+                <a14:hiddenLine xmlns:a14="http://schemas.microsoft.com/office/drawing/2010/main" xmlns="" w="9525">
                   <a:solidFill>
                     <a:srgbClr val="000000"/>
                   </a:solidFill>
@@ -1465,7 +1466,7 @@
             </a:ln>
             <a:extLst>
               <a:ext uri="{91240B29-F687-4f45-9708-019B960494DF}">
-                <a14:hiddenLine xmlns="" xmlns:a14="http://schemas.microsoft.com/office/drawing/2010/main" w="9525">
+                <a14:hiddenLine xmlns:a14="http://schemas.microsoft.com/office/drawing/2010/main" xmlns="" w="9525">
                   <a:solidFill>
                     <a:srgbClr val="000000"/>
                   </a:solidFill>
@@ -1555,7 +1556,7 @@
             </a:ln>
             <a:extLst>
               <a:ext uri="{91240B29-F687-4f45-9708-019B960494DF}">
-                <a14:hiddenLine xmlns="" xmlns:a14="http://schemas.microsoft.com/office/drawing/2010/main" w="9525">
+                <a14:hiddenLine xmlns:a14="http://schemas.microsoft.com/office/drawing/2010/main" xmlns="" w="9525">
                   <a:solidFill>
                     <a:srgbClr val="000000"/>
                   </a:solidFill>
@@ -1617,7 +1618,7 @@
             </a:ln>
             <a:extLst>
               <a:ext uri="{91240B29-F687-4f45-9708-019B960494DF}">
-                <a14:hiddenLine xmlns="" xmlns:a14="http://schemas.microsoft.com/office/drawing/2010/main" w="9525">
+                <a14:hiddenLine xmlns:a14="http://schemas.microsoft.com/office/drawing/2010/main" xmlns="" w="9525">
                   <a:solidFill>
                     <a:srgbClr val="000000"/>
                   </a:solidFill>
@@ -1727,7 +1728,7 @@
             </a:ln>
             <a:extLst>
               <a:ext uri="{91240B29-F687-4f45-9708-019B960494DF}">
-                <a14:hiddenLine xmlns="" xmlns:a14="http://schemas.microsoft.com/office/drawing/2010/main" w="9525">
+                <a14:hiddenLine xmlns:a14="http://schemas.microsoft.com/office/drawing/2010/main" xmlns="" w="9525">
                   <a:solidFill>
                     <a:srgbClr val="000000"/>
                   </a:solidFill>
@@ -1789,7 +1790,7 @@
             </a:ln>
             <a:extLst>
               <a:ext uri="{91240B29-F687-4f45-9708-019B960494DF}">
-                <a14:hiddenLine xmlns="" xmlns:a14="http://schemas.microsoft.com/office/drawing/2010/main" w="9525">
+                <a14:hiddenLine xmlns:a14="http://schemas.microsoft.com/office/drawing/2010/main" xmlns="" w="9525">
                   <a:solidFill>
                     <a:srgbClr val="000000"/>
                   </a:solidFill>
@@ -1879,7 +1880,7 @@
             </a:ln>
             <a:extLst>
               <a:ext uri="{91240B29-F687-4f45-9708-019B960494DF}">
-                <a14:hiddenLine xmlns="" xmlns:a14="http://schemas.microsoft.com/office/drawing/2010/main" w="9525">
+                <a14:hiddenLine xmlns:a14="http://schemas.microsoft.com/office/drawing/2010/main" xmlns="" w="9525">
                   <a:solidFill>
                     <a:srgbClr val="000000"/>
                   </a:solidFill>
@@ -1969,7 +1970,7 @@
             </a:ln>
             <a:extLst>
               <a:ext uri="{91240B29-F687-4f45-9708-019B960494DF}">
-                <a14:hiddenLine xmlns="" xmlns:a14="http://schemas.microsoft.com/office/drawing/2010/main" w="9525">
+                <a14:hiddenLine xmlns:a14="http://schemas.microsoft.com/office/drawing/2010/main" xmlns="" w="9525">
                   <a:solidFill>
                     <a:srgbClr val="000000"/>
                   </a:solidFill>
@@ -2031,7 +2032,7 @@
             </a:ln>
             <a:extLst>
               <a:ext uri="{91240B29-F687-4f45-9708-019B960494DF}">
-                <a14:hiddenLine xmlns="" xmlns:a14="http://schemas.microsoft.com/office/drawing/2010/main" w="9525">
+                <a14:hiddenLine xmlns:a14="http://schemas.microsoft.com/office/drawing/2010/main" xmlns="" w="9525">
                   <a:solidFill>
                     <a:srgbClr val="000000"/>
                   </a:solidFill>
@@ -2121,7 +2122,7 @@
             </a:ln>
             <a:extLst>
               <a:ext uri="{91240B29-F687-4f45-9708-019B960494DF}">
-                <a14:hiddenLine xmlns="" xmlns:a14="http://schemas.microsoft.com/office/drawing/2010/main" w="9525">
+                <a14:hiddenLine xmlns:a14="http://schemas.microsoft.com/office/drawing/2010/main" xmlns="" w="9525">
                   <a:solidFill>
                     <a:srgbClr val="000000"/>
                   </a:solidFill>
@@ -2211,7 +2212,7 @@
             </a:ln>
             <a:extLst>
               <a:ext uri="{91240B29-F687-4f45-9708-019B960494DF}">
-                <a14:hiddenLine xmlns="" xmlns:a14="http://schemas.microsoft.com/office/drawing/2010/main" w="9525">
+                <a14:hiddenLine xmlns:a14="http://schemas.microsoft.com/office/drawing/2010/main" xmlns="" w="9525">
                   <a:solidFill>
                     <a:srgbClr val="000000"/>
                   </a:solidFill>
@@ -2267,7 +2268,7 @@
             </a:ln>
             <a:extLst>
               <a:ext uri="{91240B29-F687-4f45-9708-019B960494DF}">
-                <a14:hiddenLine xmlns="" xmlns:a14="http://schemas.microsoft.com/office/drawing/2010/main" w="9525">
+                <a14:hiddenLine xmlns:a14="http://schemas.microsoft.com/office/drawing/2010/main" xmlns="" w="9525">
                   <a:solidFill>
                     <a:srgbClr val="000000"/>
                   </a:solidFill>
@@ -2357,7 +2358,7 @@
             </a:ln>
             <a:extLst>
               <a:ext uri="{91240B29-F687-4f45-9708-019B960494DF}">
-                <a14:hiddenLine xmlns="" xmlns:a14="http://schemas.microsoft.com/office/drawing/2010/main" w="9525">
+                <a14:hiddenLine xmlns:a14="http://schemas.microsoft.com/office/drawing/2010/main" xmlns="" w="9525">
                   <a:solidFill>
                     <a:srgbClr val="000000"/>
                   </a:solidFill>
@@ -2413,7 +2414,7 @@
             </a:ln>
             <a:extLst>
               <a:ext uri="{91240B29-F687-4f45-9708-019B960494DF}">
-                <a14:hiddenLine xmlns="" xmlns:a14="http://schemas.microsoft.com/office/drawing/2010/main" w="9525">
+                <a14:hiddenLine xmlns:a14="http://schemas.microsoft.com/office/drawing/2010/main" xmlns="" w="9525">
                   <a:solidFill>
                     <a:srgbClr val="000000"/>
                   </a:solidFill>
@@ -2503,7 +2504,7 @@
             </a:ln>
             <a:extLst>
               <a:ext uri="{91240B29-F687-4f45-9708-019B960494DF}">
-                <a14:hiddenLine xmlns="" xmlns:a14="http://schemas.microsoft.com/office/drawing/2010/main" w="9525">
+                <a14:hiddenLine xmlns:a14="http://schemas.microsoft.com/office/drawing/2010/main" xmlns="" w="9525">
                   <a:solidFill>
                     <a:srgbClr val="000000"/>
                   </a:solidFill>
@@ -2571,7 +2572,7 @@
             </a:ln>
             <a:extLst>
               <a:ext uri="{91240B29-F687-4f45-9708-019B960494DF}">
-                <a14:hiddenLine xmlns="" xmlns:a14="http://schemas.microsoft.com/office/drawing/2010/main" w="9525">
+                <a14:hiddenLine xmlns:a14="http://schemas.microsoft.com/office/drawing/2010/main" xmlns="" w="9525">
                   <a:solidFill>
                     <a:srgbClr val="000000"/>
                   </a:solidFill>
@@ -2661,7 +2662,7 @@
             </a:ln>
             <a:extLst>
               <a:ext uri="{91240B29-F687-4f45-9708-019B960494DF}">
-                <a14:hiddenLine xmlns="" xmlns:a14="http://schemas.microsoft.com/office/drawing/2010/main" w="9525">
+                <a14:hiddenLine xmlns:a14="http://schemas.microsoft.com/office/drawing/2010/main" xmlns="" w="9525">
                   <a:solidFill>
                     <a:srgbClr val="000000"/>
                   </a:solidFill>
@@ -2729,7 +2730,7 @@
             </a:ln>
             <a:extLst>
               <a:ext uri="{91240B29-F687-4f45-9708-019B960494DF}">
-                <a14:hiddenLine xmlns="" xmlns:a14="http://schemas.microsoft.com/office/drawing/2010/main" w="9525">
+                <a14:hiddenLine xmlns:a14="http://schemas.microsoft.com/office/drawing/2010/main" xmlns="" w="9525">
                   <a:solidFill>
                     <a:srgbClr val="000000"/>
                   </a:solidFill>
@@ -2819,7 +2820,7 @@
             </a:ln>
             <a:extLst>
               <a:ext uri="{91240B29-F687-4f45-9708-019B960494DF}">
-                <a14:hiddenLine xmlns="" xmlns:a14="http://schemas.microsoft.com/office/drawing/2010/main" w="9525">
+                <a14:hiddenLine xmlns:a14="http://schemas.microsoft.com/office/drawing/2010/main" xmlns="" w="9525">
                   <a:solidFill>
                     <a:srgbClr val="000000"/>
                   </a:solidFill>
@@ -2853,7 +2854,7 @@
             </a:ln>
             <a:extLst>
               <a:ext uri="{91240B29-F687-4f45-9708-019B960494DF}">
-                <a14:hiddenLine xmlns="" xmlns:a14="http://schemas.microsoft.com/office/drawing/2010/main" w="9525">
+                <a14:hiddenLine xmlns:a14="http://schemas.microsoft.com/office/drawing/2010/main" xmlns="" w="9525">
                   <a:solidFill>
                     <a:srgbClr val="000000"/>
                   </a:solidFill>
@@ -2943,7 +2944,7 @@
             </a:ln>
             <a:extLst>
               <a:ext uri="{91240B29-F687-4f45-9708-019B960494DF}">
-                <a14:hiddenLine xmlns="" xmlns:a14="http://schemas.microsoft.com/office/drawing/2010/main" w="9525">
+                <a14:hiddenLine xmlns:a14="http://schemas.microsoft.com/office/drawing/2010/main" xmlns="" w="9525">
                   <a:solidFill>
                     <a:srgbClr val="000000"/>
                   </a:solidFill>
@@ -3005,7 +3006,7 @@
             </a:ln>
             <a:extLst>
               <a:ext uri="{91240B29-F687-4f45-9708-019B960494DF}">
-                <a14:hiddenLine xmlns="" xmlns:a14="http://schemas.microsoft.com/office/drawing/2010/main" w="9525">
+                <a14:hiddenLine xmlns:a14="http://schemas.microsoft.com/office/drawing/2010/main" xmlns="" w="9525">
                   <a:solidFill>
                     <a:srgbClr val="000000"/>
                   </a:solidFill>
@@ -3067,7 +3068,7 @@
             </a:ln>
             <a:extLst>
               <a:ext uri="{91240B29-F687-4f45-9708-019B960494DF}">
-                <a14:hiddenLine xmlns="" xmlns:a14="http://schemas.microsoft.com/office/drawing/2010/main" w="9525">
+                <a14:hiddenLine xmlns:a14="http://schemas.microsoft.com/office/drawing/2010/main" xmlns="" w="9525">
                   <a:solidFill>
                     <a:srgbClr val="000000"/>
                   </a:solidFill>
@@ -3157,7 +3158,7 @@
             </a:ln>
             <a:extLst>
               <a:ext uri="{91240B29-F687-4f45-9708-019B960494DF}">
-                <a14:hiddenLine xmlns="" xmlns:a14="http://schemas.microsoft.com/office/drawing/2010/main" w="9525">
+                <a14:hiddenLine xmlns:a14="http://schemas.microsoft.com/office/drawing/2010/main" xmlns="" w="9525">
                   <a:solidFill>
                     <a:srgbClr val="000000"/>
                   </a:solidFill>
@@ -3225,7 +3226,7 @@
             </a:ln>
             <a:extLst>
               <a:ext uri="{91240B29-F687-4f45-9708-019B960494DF}">
-                <a14:hiddenLine xmlns="" xmlns:a14="http://schemas.microsoft.com/office/drawing/2010/main" w="9525">
+                <a14:hiddenLine xmlns:a14="http://schemas.microsoft.com/office/drawing/2010/main" xmlns="" w="9525">
                   <a:solidFill>
                     <a:srgbClr val="000000"/>
                   </a:solidFill>
@@ -3287,7 +3288,7 @@
             </a:ln>
             <a:extLst>
               <a:ext uri="{91240B29-F687-4f45-9708-019B960494DF}">
-                <a14:hiddenLine xmlns="" xmlns:a14="http://schemas.microsoft.com/office/drawing/2010/main" w="9525">
+                <a14:hiddenLine xmlns:a14="http://schemas.microsoft.com/office/drawing/2010/main" xmlns="" w="9525">
                   <a:solidFill>
                     <a:srgbClr val="000000"/>
                   </a:solidFill>
@@ -3377,7 +3378,7 @@
             </a:ln>
             <a:extLst>
               <a:ext uri="{91240B29-F687-4f45-9708-019B960494DF}">
-                <a14:hiddenLine xmlns="" xmlns:a14="http://schemas.microsoft.com/office/drawing/2010/main" w="9525">
+                <a14:hiddenLine xmlns:a14="http://schemas.microsoft.com/office/drawing/2010/main" xmlns="" w="9525">
                   <a:solidFill>
                     <a:srgbClr val="000000"/>
                   </a:solidFill>
@@ -3439,7 +3440,7 @@
             </a:ln>
             <a:extLst>
               <a:ext uri="{91240B29-F687-4f45-9708-019B960494DF}">
-                <a14:hiddenLine xmlns="" xmlns:a14="http://schemas.microsoft.com/office/drawing/2010/main" w="9525">
+                <a14:hiddenLine xmlns:a14="http://schemas.microsoft.com/office/drawing/2010/main" xmlns="" w="9525">
                   <a:solidFill>
                     <a:srgbClr val="000000"/>
                   </a:solidFill>
@@ -3529,7 +3530,7 @@
             </a:ln>
             <a:extLst>
               <a:ext uri="{91240B29-F687-4f45-9708-019B960494DF}">
-                <a14:hiddenLine xmlns="" xmlns:a14="http://schemas.microsoft.com/office/drawing/2010/main" w="9525">
+                <a14:hiddenLine xmlns:a14="http://schemas.microsoft.com/office/drawing/2010/main" xmlns="" w="9525">
                   <a:solidFill>
                     <a:srgbClr val="000000"/>
                   </a:solidFill>
@@ -3591,7 +3592,7 @@
             </a:ln>
             <a:extLst>
               <a:ext uri="{91240B29-F687-4f45-9708-019B960494DF}">
-                <a14:hiddenLine xmlns="" xmlns:a14="http://schemas.microsoft.com/office/drawing/2010/main" w="9525">
+                <a14:hiddenLine xmlns:a14="http://schemas.microsoft.com/office/drawing/2010/main" xmlns="" w="9525">
                   <a:solidFill>
                     <a:srgbClr val="000000"/>
                   </a:solidFill>
@@ -3681,7 +3682,7 @@
             </a:ln>
             <a:extLst>
               <a:ext uri="{91240B29-F687-4f45-9708-019B960494DF}">
-                <a14:hiddenLine xmlns="" xmlns:a14="http://schemas.microsoft.com/office/drawing/2010/main" w="9525">
+                <a14:hiddenLine xmlns:a14="http://schemas.microsoft.com/office/drawing/2010/main" xmlns="" w="9525">
                   <a:solidFill>
                     <a:srgbClr val="000000"/>
                   </a:solidFill>
@@ -3715,7 +3716,7 @@
             </a:ln>
             <a:extLst>
               <a:ext uri="{91240B29-F687-4f45-9708-019B960494DF}">
-                <a14:hiddenLine xmlns="" xmlns:a14="http://schemas.microsoft.com/office/drawing/2010/main" w="9525">
+                <a14:hiddenLine xmlns:a14="http://schemas.microsoft.com/office/drawing/2010/main" xmlns="" w="9525">
                   <a:solidFill>
                     <a:srgbClr val="000000"/>
                   </a:solidFill>
@@ -3780,7 +3781,7 @@
             </a:ln>
             <a:extLst>
               <a:ext uri="{91240B29-F687-4f45-9708-019B960494DF}">
-                <a14:hiddenLine xmlns="" xmlns:a14="http://schemas.microsoft.com/office/drawing/2010/main" w="9525">
+                <a14:hiddenLine xmlns:a14="http://schemas.microsoft.com/office/drawing/2010/main" xmlns="" w="9525">
                   <a:solidFill>
                     <a:srgbClr val="000000"/>
                   </a:solidFill>
@@ -3870,7 +3871,7 @@
             </a:ln>
             <a:extLst>
               <a:ext uri="{91240B29-F687-4f45-9708-019B960494DF}">
-                <a14:hiddenLine xmlns="" xmlns:a14="http://schemas.microsoft.com/office/drawing/2010/main" w="9525">
+                <a14:hiddenLine xmlns:a14="http://schemas.microsoft.com/office/drawing/2010/main" xmlns="" w="9525">
                   <a:solidFill>
                     <a:srgbClr val="000000"/>
                   </a:solidFill>
@@ -3932,7 +3933,7 @@
             </a:ln>
             <a:extLst>
               <a:ext uri="{91240B29-F687-4f45-9708-019B960494DF}">
-                <a14:hiddenLine xmlns="" xmlns:a14="http://schemas.microsoft.com/office/drawing/2010/main" w="9525">
+                <a14:hiddenLine xmlns:a14="http://schemas.microsoft.com/office/drawing/2010/main" xmlns="" w="9525">
                   <a:solidFill>
                     <a:srgbClr val="000000"/>
                   </a:solidFill>
@@ -4022,7 +4023,7 @@
             </a:ln>
             <a:extLst>
               <a:ext uri="{91240B29-F687-4f45-9708-019B960494DF}">
-                <a14:hiddenLine xmlns="" xmlns:a14="http://schemas.microsoft.com/office/drawing/2010/main" w="9525">
+                <a14:hiddenLine xmlns:a14="http://schemas.microsoft.com/office/drawing/2010/main" xmlns="" w="9525">
                   <a:solidFill>
                     <a:srgbClr val="000000"/>
                   </a:solidFill>
@@ -4112,7 +4113,7 @@
             </a:ln>
             <a:extLst>
               <a:ext uri="{91240B29-F687-4f45-9708-019B960494DF}">
-                <a14:hiddenLine xmlns="" xmlns:a14="http://schemas.microsoft.com/office/drawing/2010/main" w="9525">
+                <a14:hiddenLine xmlns:a14="http://schemas.microsoft.com/office/drawing/2010/main" xmlns="" w="9525">
                   <a:solidFill>
                     <a:srgbClr val="000000"/>
                   </a:solidFill>
@@ -4177,7 +4178,7 @@
             </a:ln>
             <a:extLst>
               <a:ext uri="{91240B29-F687-4f45-9708-019B960494DF}">
-                <a14:hiddenLine xmlns="" xmlns:a14="http://schemas.microsoft.com/office/drawing/2010/main" w="9525">
+                <a14:hiddenLine xmlns:a14="http://schemas.microsoft.com/office/drawing/2010/main" xmlns="" w="9525">
                   <a:solidFill>
                     <a:srgbClr val="000000"/>
                   </a:solidFill>
@@ -4239,7 +4240,7 @@
             </a:ln>
             <a:extLst>
               <a:ext uri="{91240B29-F687-4f45-9708-019B960494DF}">
-                <a14:hiddenLine xmlns="" xmlns:a14="http://schemas.microsoft.com/office/drawing/2010/main" w="9525">
+                <a14:hiddenLine xmlns:a14="http://schemas.microsoft.com/office/drawing/2010/main" xmlns="" w="9525">
                   <a:solidFill>
                     <a:srgbClr val="000000"/>
                   </a:solidFill>
@@ -4329,7 +4330,7 @@
             </a:ln>
             <a:extLst>
               <a:ext uri="{91240B29-F687-4f45-9708-019B960494DF}">
-                <a14:hiddenLine xmlns="" xmlns:a14="http://schemas.microsoft.com/office/drawing/2010/main" w="9525">
+                <a14:hiddenLine xmlns:a14="http://schemas.microsoft.com/office/drawing/2010/main" xmlns="" w="9525">
                   <a:solidFill>
                     <a:srgbClr val="000000"/>
                   </a:solidFill>
@@ -4419,7 +4420,7 @@
             </a:ln>
             <a:extLst>
               <a:ext uri="{91240B29-F687-4f45-9708-019B960494DF}">
-                <a14:hiddenLine xmlns="" xmlns:a14="http://schemas.microsoft.com/office/drawing/2010/main" w="9525">
+                <a14:hiddenLine xmlns:a14="http://schemas.microsoft.com/office/drawing/2010/main" xmlns="" w="9525">
                   <a:solidFill>
                     <a:srgbClr val="000000"/>
                   </a:solidFill>
@@ -4481,7 +4482,7 @@
             </a:ln>
             <a:extLst>
               <a:ext uri="{91240B29-F687-4f45-9708-019B960494DF}">
-                <a14:hiddenLine xmlns="" xmlns:a14="http://schemas.microsoft.com/office/drawing/2010/main" w="9525">
+                <a14:hiddenLine xmlns:a14="http://schemas.microsoft.com/office/drawing/2010/main" xmlns="" w="9525">
                   <a:solidFill>
                     <a:srgbClr val="000000"/>
                   </a:solidFill>
@@ -4601,7 +4602,7 @@
             </a:ln>
             <a:extLst>
               <a:ext uri="{91240B29-F687-4f45-9708-019B960494DF}">
-                <a14:hiddenLine xmlns="" xmlns:a14="http://schemas.microsoft.com/office/drawing/2010/main" w="9525">
+                <a14:hiddenLine xmlns:a14="http://schemas.microsoft.com/office/drawing/2010/main" xmlns="" w="9525">
                   <a:solidFill>
                     <a:srgbClr val="000000"/>
                   </a:solidFill>
@@ -4669,7 +4670,7 @@
             </a:ln>
             <a:extLst>
               <a:ext uri="{91240B29-F687-4f45-9708-019B960494DF}">
-                <a14:hiddenLine xmlns="" xmlns:a14="http://schemas.microsoft.com/office/drawing/2010/main" w="9525">
+                <a14:hiddenLine xmlns:a14="http://schemas.microsoft.com/office/drawing/2010/main" xmlns="" w="9525">
                   <a:solidFill>
                     <a:srgbClr val="000000"/>
                   </a:solidFill>
@@ -4759,7 +4760,7 @@
             </a:ln>
             <a:extLst>
               <a:ext uri="{91240B29-F687-4f45-9708-019B960494DF}">
-                <a14:hiddenLine xmlns="" xmlns:a14="http://schemas.microsoft.com/office/drawing/2010/main" w="9525">
+                <a14:hiddenLine xmlns:a14="http://schemas.microsoft.com/office/drawing/2010/main" xmlns="" w="9525">
                   <a:solidFill>
                     <a:srgbClr val="000000"/>
                   </a:solidFill>
@@ -9600,7 +9601,7 @@
           <a:noFill/>
           <a:extLst>
             <a:ext uri="{909E8E84-426E-40dd-AFC4-6F175D3DCCD1}">
-              <a14:hiddenFill xmlns="" xmlns:a14="http://schemas.microsoft.com/office/drawing/2010/main">
+              <a14:hiddenFill xmlns:a14="http://schemas.microsoft.com/office/drawing/2010/main" xmlns="">
                 <a:solidFill>
                   <a:srgbClr val="FFFFFF"/>
                 </a:solidFill>
@@ -9674,7 +9675,7 @@
               </a:ln>
               <a:extLst>
                 <a:ext uri="{91240B29-F687-4f45-9708-019B960494DF}">
-                  <a14:hiddenLine xmlns="" xmlns:a14="http://schemas.microsoft.com/office/drawing/2010/main" w="9525">
+                  <a14:hiddenLine xmlns:a14="http://schemas.microsoft.com/office/drawing/2010/main" xmlns="" w="9525">
                     <a:solidFill>
                       <a:srgbClr val="000000"/>
                     </a:solidFill>
@@ -9764,7 +9765,7 @@
               </a:ln>
               <a:extLst>
                 <a:ext uri="{91240B29-F687-4f45-9708-019B960494DF}">
-                  <a14:hiddenLine xmlns="" xmlns:a14="http://schemas.microsoft.com/office/drawing/2010/main" w="9525">
+                  <a14:hiddenLine xmlns:a14="http://schemas.microsoft.com/office/drawing/2010/main" xmlns="" w="9525">
                     <a:solidFill>
                       <a:srgbClr val="000000"/>
                     </a:solidFill>
@@ -9854,7 +9855,7 @@
               </a:ln>
               <a:extLst>
                 <a:ext uri="{91240B29-F687-4f45-9708-019B960494DF}">
-                  <a14:hiddenLine xmlns="" xmlns:a14="http://schemas.microsoft.com/office/drawing/2010/main" w="9525">
+                  <a14:hiddenLine xmlns:a14="http://schemas.microsoft.com/office/drawing/2010/main" xmlns="" w="9525">
                     <a:solidFill>
                       <a:srgbClr val="000000"/>
                     </a:solidFill>
@@ -9916,7 +9917,7 @@
               </a:ln>
               <a:extLst>
                 <a:ext uri="{91240B29-F687-4f45-9708-019B960494DF}">
-                  <a14:hiddenLine xmlns="" xmlns:a14="http://schemas.microsoft.com/office/drawing/2010/main" w="9525">
+                  <a14:hiddenLine xmlns:a14="http://schemas.microsoft.com/office/drawing/2010/main" xmlns="" w="9525">
                     <a:solidFill>
                       <a:srgbClr val="000000"/>
                     </a:solidFill>
@@ -10006,7 +10007,7 @@
               </a:ln>
               <a:extLst>
                 <a:ext uri="{91240B29-F687-4f45-9708-019B960494DF}">
-                  <a14:hiddenLine xmlns="" xmlns:a14="http://schemas.microsoft.com/office/drawing/2010/main" w="9525">
+                  <a14:hiddenLine xmlns:a14="http://schemas.microsoft.com/office/drawing/2010/main" xmlns="" w="9525">
                     <a:solidFill>
                       <a:srgbClr val="000000"/>
                     </a:solidFill>
@@ -10068,7 +10069,7 @@
               </a:ln>
               <a:extLst>
                 <a:ext uri="{91240B29-F687-4f45-9708-019B960494DF}">
-                  <a14:hiddenLine xmlns="" xmlns:a14="http://schemas.microsoft.com/office/drawing/2010/main" w="9525">
+                  <a14:hiddenLine xmlns:a14="http://schemas.microsoft.com/office/drawing/2010/main" xmlns="" w="9525">
                     <a:solidFill>
                       <a:srgbClr val="000000"/>
                     </a:solidFill>
@@ -10130,7 +10131,7 @@
               </a:ln>
               <a:extLst>
                 <a:ext uri="{91240B29-F687-4f45-9708-019B960494DF}">
-                  <a14:hiddenLine xmlns="" xmlns:a14="http://schemas.microsoft.com/office/drawing/2010/main" w="9525">
+                  <a14:hiddenLine xmlns:a14="http://schemas.microsoft.com/office/drawing/2010/main" xmlns="" w="9525">
                     <a:solidFill>
                       <a:srgbClr val="000000"/>
                     </a:solidFill>
@@ -10220,7 +10221,7 @@
               </a:ln>
               <a:extLst>
                 <a:ext uri="{91240B29-F687-4f45-9708-019B960494DF}">
-                  <a14:hiddenLine xmlns="" xmlns:a14="http://schemas.microsoft.com/office/drawing/2010/main" w="9525">
+                  <a14:hiddenLine xmlns:a14="http://schemas.microsoft.com/office/drawing/2010/main" xmlns="" w="9525">
                     <a:solidFill>
                       <a:srgbClr val="000000"/>
                     </a:solidFill>
@@ -10310,7 +10311,7 @@
               </a:ln>
               <a:extLst>
                 <a:ext uri="{91240B29-F687-4f45-9708-019B960494DF}">
-                  <a14:hiddenLine xmlns="" xmlns:a14="http://schemas.microsoft.com/office/drawing/2010/main" w="9525">
+                  <a14:hiddenLine xmlns:a14="http://schemas.microsoft.com/office/drawing/2010/main" xmlns="" w="9525">
                     <a:solidFill>
                       <a:srgbClr val="000000"/>
                     </a:solidFill>
@@ -10372,7 +10373,7 @@
               </a:ln>
               <a:extLst>
                 <a:ext uri="{91240B29-F687-4f45-9708-019B960494DF}">
-                  <a14:hiddenLine xmlns="" xmlns:a14="http://schemas.microsoft.com/office/drawing/2010/main" w="9525">
+                  <a14:hiddenLine xmlns:a14="http://schemas.microsoft.com/office/drawing/2010/main" xmlns="" w="9525">
                     <a:solidFill>
                       <a:srgbClr val="000000"/>
                     </a:solidFill>
@@ -10482,7 +10483,7 @@
               </a:ln>
               <a:extLst>
                 <a:ext uri="{91240B29-F687-4f45-9708-019B960494DF}">
-                  <a14:hiddenLine xmlns="" xmlns:a14="http://schemas.microsoft.com/office/drawing/2010/main" w="9525">
+                  <a14:hiddenLine xmlns:a14="http://schemas.microsoft.com/office/drawing/2010/main" xmlns="" w="9525">
                     <a:solidFill>
                       <a:srgbClr val="000000"/>
                     </a:solidFill>
@@ -10566,7 +10567,7 @@
               </a:ln>
               <a:extLst>
                 <a:ext uri="{91240B29-F687-4f45-9708-019B960494DF}">
-                  <a14:hiddenLine xmlns="" xmlns:a14="http://schemas.microsoft.com/office/drawing/2010/main" w="9525">
+                  <a14:hiddenLine xmlns:a14="http://schemas.microsoft.com/office/drawing/2010/main" xmlns="" w="9525">
                     <a:solidFill>
                       <a:srgbClr val="000000"/>
                     </a:solidFill>
@@ -10628,7 +10629,7 @@
               </a:ln>
               <a:extLst>
                 <a:ext uri="{91240B29-F687-4f45-9708-019B960494DF}">
-                  <a14:hiddenLine xmlns="" xmlns:a14="http://schemas.microsoft.com/office/drawing/2010/main" w="9525">
+                  <a14:hiddenLine xmlns:a14="http://schemas.microsoft.com/office/drawing/2010/main" xmlns="" w="9525">
                     <a:solidFill>
                       <a:srgbClr val="000000"/>
                     </a:solidFill>
@@ -10690,7 +10691,7 @@
               </a:ln>
               <a:extLst>
                 <a:ext uri="{91240B29-F687-4f45-9708-019B960494DF}">
-                  <a14:hiddenLine xmlns="" xmlns:a14="http://schemas.microsoft.com/office/drawing/2010/main" w="9525">
+                  <a14:hiddenLine xmlns:a14="http://schemas.microsoft.com/office/drawing/2010/main" xmlns="" w="9525">
                     <a:solidFill>
                       <a:srgbClr val="000000"/>
                     </a:solidFill>
@@ -10780,7 +10781,7 @@
               </a:ln>
               <a:extLst>
                 <a:ext uri="{91240B29-F687-4f45-9708-019B960494DF}">
-                  <a14:hiddenLine xmlns="" xmlns:a14="http://schemas.microsoft.com/office/drawing/2010/main" w="9525">
+                  <a14:hiddenLine xmlns:a14="http://schemas.microsoft.com/office/drawing/2010/main" xmlns="" w="9525">
                     <a:solidFill>
                       <a:srgbClr val="000000"/>
                     </a:solidFill>
@@ -10814,7 +10815,7 @@
               </a:ln>
               <a:extLst>
                 <a:ext uri="{91240B29-F687-4f45-9708-019B960494DF}">
-                  <a14:hiddenLine xmlns="" xmlns:a14="http://schemas.microsoft.com/office/drawing/2010/main" w="9525">
+                  <a14:hiddenLine xmlns:a14="http://schemas.microsoft.com/office/drawing/2010/main" xmlns="" w="9525">
                     <a:solidFill>
                       <a:srgbClr val="000000"/>
                     </a:solidFill>
@@ -10879,7 +10880,7 @@
               </a:ln>
               <a:extLst>
                 <a:ext uri="{91240B29-F687-4f45-9708-019B960494DF}">
-                  <a14:hiddenLine xmlns="" xmlns:a14="http://schemas.microsoft.com/office/drawing/2010/main" w="9525">
+                  <a14:hiddenLine xmlns:a14="http://schemas.microsoft.com/office/drawing/2010/main" xmlns="" w="9525">
                     <a:solidFill>
                       <a:srgbClr val="000000"/>
                     </a:solidFill>
@@ -10969,7 +10970,7 @@
               </a:ln>
               <a:extLst>
                 <a:ext uri="{91240B29-F687-4f45-9708-019B960494DF}">
-                  <a14:hiddenLine xmlns="" xmlns:a14="http://schemas.microsoft.com/office/drawing/2010/main" w="9525">
+                  <a14:hiddenLine xmlns:a14="http://schemas.microsoft.com/office/drawing/2010/main" xmlns="" w="9525">
                     <a:solidFill>
                       <a:srgbClr val="000000"/>
                     </a:solidFill>
@@ -11031,7 +11032,7 @@
               </a:ln>
               <a:extLst>
                 <a:ext uri="{91240B29-F687-4f45-9708-019B960494DF}">
-                  <a14:hiddenLine xmlns="" xmlns:a14="http://schemas.microsoft.com/office/drawing/2010/main" w="9525">
+                  <a14:hiddenLine xmlns:a14="http://schemas.microsoft.com/office/drawing/2010/main" xmlns="" w="9525">
                     <a:solidFill>
                       <a:srgbClr val="000000"/>
                     </a:solidFill>
@@ -11121,7 +11122,7 @@
               </a:ln>
               <a:extLst>
                 <a:ext uri="{91240B29-F687-4f45-9708-019B960494DF}">
-                  <a14:hiddenLine xmlns="" xmlns:a14="http://schemas.microsoft.com/office/drawing/2010/main" w="9525">
+                  <a14:hiddenLine xmlns:a14="http://schemas.microsoft.com/office/drawing/2010/main" xmlns="" w="9525">
                     <a:solidFill>
                       <a:srgbClr val="000000"/>
                     </a:solidFill>
@@ -11186,7 +11187,7 @@
               </a:ln>
               <a:extLst>
                 <a:ext uri="{91240B29-F687-4f45-9708-019B960494DF}">
-                  <a14:hiddenLine xmlns="" xmlns:a14="http://schemas.microsoft.com/office/drawing/2010/main" w="9525">
+                  <a14:hiddenLine xmlns:a14="http://schemas.microsoft.com/office/drawing/2010/main" xmlns="" w="9525">
                     <a:solidFill>
                       <a:srgbClr val="000000"/>
                     </a:solidFill>
@@ -11248,7 +11249,7 @@
               </a:ln>
               <a:extLst>
                 <a:ext uri="{91240B29-F687-4f45-9708-019B960494DF}">
-                  <a14:hiddenLine xmlns="" xmlns:a14="http://schemas.microsoft.com/office/drawing/2010/main" w="9525">
+                  <a14:hiddenLine xmlns:a14="http://schemas.microsoft.com/office/drawing/2010/main" xmlns="" w="9525">
                     <a:solidFill>
                       <a:srgbClr val="000000"/>
                     </a:solidFill>
@@ -11338,7 +11339,7 @@
               </a:ln>
               <a:extLst>
                 <a:ext uri="{91240B29-F687-4f45-9708-019B960494DF}">
-                  <a14:hiddenLine xmlns="" xmlns:a14="http://schemas.microsoft.com/office/drawing/2010/main" w="9525">
+                  <a14:hiddenLine xmlns:a14="http://schemas.microsoft.com/office/drawing/2010/main" xmlns="" w="9525">
                     <a:solidFill>
                       <a:srgbClr val="000000"/>
                     </a:solidFill>
@@ -11428,7 +11429,7 @@
               </a:ln>
               <a:extLst>
                 <a:ext uri="{91240B29-F687-4f45-9708-019B960494DF}">
-                  <a14:hiddenLine xmlns="" xmlns:a14="http://schemas.microsoft.com/office/drawing/2010/main" w="9525">
+                  <a14:hiddenLine xmlns:a14="http://schemas.microsoft.com/office/drawing/2010/main" xmlns="" w="9525">
                     <a:solidFill>
                       <a:srgbClr val="000000"/>
                     </a:solidFill>
@@ -11493,7 +11494,7 @@
               </a:ln>
               <a:extLst>
                 <a:ext uri="{91240B29-F687-4f45-9708-019B960494DF}">
-                  <a14:hiddenLine xmlns="" xmlns:a14="http://schemas.microsoft.com/office/drawing/2010/main" w="9525">
+                  <a14:hiddenLine xmlns:a14="http://schemas.microsoft.com/office/drawing/2010/main" xmlns="" w="9525">
                     <a:solidFill>
                       <a:srgbClr val="000000"/>
                     </a:solidFill>
@@ -11613,7 +11614,7 @@
               </a:ln>
               <a:extLst>
                 <a:ext uri="{91240B29-F687-4f45-9708-019B960494DF}">
-                  <a14:hiddenLine xmlns="" xmlns:a14="http://schemas.microsoft.com/office/drawing/2010/main" w="9525">
+                  <a14:hiddenLine xmlns:a14="http://schemas.microsoft.com/office/drawing/2010/main" xmlns="" w="9525">
                     <a:solidFill>
                       <a:srgbClr val="000000"/>
                     </a:solidFill>
@@ -11711,7 +11712,7 @@
               </a:ln>
               <a:extLst>
                 <a:ext uri="{91240B29-F687-4f45-9708-019B960494DF}">
-                  <a14:hiddenLine xmlns="" xmlns:a14="http://schemas.microsoft.com/office/drawing/2010/main" w="9525">
+                  <a14:hiddenLine xmlns:a14="http://schemas.microsoft.com/office/drawing/2010/main" xmlns="" w="9525">
                     <a:solidFill>
                       <a:srgbClr val="000000"/>
                     </a:solidFill>
@@ -11826,7 +11827,7 @@
               </a:ln>
               <a:extLst>
                 <a:ext uri="{91240B29-F687-4f45-9708-019B960494DF}">
-                  <a14:hiddenLine xmlns="" xmlns:a14="http://schemas.microsoft.com/office/drawing/2010/main" w="9525">
+                  <a14:hiddenLine xmlns:a14="http://schemas.microsoft.com/office/drawing/2010/main" xmlns="" w="9525">
                     <a:solidFill>
                       <a:srgbClr val="000000"/>
                     </a:solidFill>
@@ -11916,7 +11917,7 @@
               </a:ln>
               <a:extLst>
                 <a:ext uri="{91240B29-F687-4f45-9708-019B960494DF}">
-                  <a14:hiddenLine xmlns="" xmlns:a14="http://schemas.microsoft.com/office/drawing/2010/main" w="9525">
+                  <a14:hiddenLine xmlns:a14="http://schemas.microsoft.com/office/drawing/2010/main" xmlns="" w="9525">
                     <a:solidFill>
                       <a:srgbClr val="000000"/>
                     </a:solidFill>
@@ -11981,7 +11982,7 @@
               </a:ln>
               <a:extLst>
                 <a:ext uri="{91240B29-F687-4f45-9708-019B960494DF}">
-                  <a14:hiddenLine xmlns="" xmlns:a14="http://schemas.microsoft.com/office/drawing/2010/main" w="9525">
+                  <a14:hiddenLine xmlns:a14="http://schemas.microsoft.com/office/drawing/2010/main" xmlns="" w="9525">
                     <a:solidFill>
                       <a:srgbClr val="000000"/>
                     </a:solidFill>
@@ -12071,7 +12072,7 @@
               </a:ln>
               <a:extLst>
                 <a:ext uri="{91240B29-F687-4f45-9708-019B960494DF}">
-                  <a14:hiddenLine xmlns="" xmlns:a14="http://schemas.microsoft.com/office/drawing/2010/main" w="9525">
+                  <a14:hiddenLine xmlns:a14="http://schemas.microsoft.com/office/drawing/2010/main" xmlns="" w="9525">
                     <a:solidFill>
                       <a:srgbClr val="000000"/>
                     </a:solidFill>
@@ -12139,7 +12140,7 @@
               </a:ln>
               <a:extLst>
                 <a:ext uri="{91240B29-F687-4f45-9708-019B960494DF}">
-                  <a14:hiddenLine xmlns="" xmlns:a14="http://schemas.microsoft.com/office/drawing/2010/main" w="9525">
+                  <a14:hiddenLine xmlns:a14="http://schemas.microsoft.com/office/drawing/2010/main" xmlns="" w="9525">
                     <a:solidFill>
                       <a:srgbClr val="000000"/>
                     </a:solidFill>
@@ -12229,7 +12230,7 @@
               </a:ln>
               <a:extLst>
                 <a:ext uri="{91240B29-F687-4f45-9708-019B960494DF}">
-                  <a14:hiddenLine xmlns="" xmlns:a14="http://schemas.microsoft.com/office/drawing/2010/main" w="9525">
+                  <a14:hiddenLine xmlns:a14="http://schemas.microsoft.com/office/drawing/2010/main" xmlns="" w="9525">
                     <a:solidFill>
                       <a:srgbClr val="000000"/>
                     </a:solidFill>
@@ -12297,7 +12298,7 @@
               </a:ln>
               <a:extLst>
                 <a:ext uri="{91240B29-F687-4f45-9708-019B960494DF}">
-                  <a14:hiddenLine xmlns="" xmlns:a14="http://schemas.microsoft.com/office/drawing/2010/main" w="9525">
+                  <a14:hiddenLine xmlns:a14="http://schemas.microsoft.com/office/drawing/2010/main" xmlns="" w="9525">
                     <a:solidFill>
                       <a:srgbClr val="000000"/>
                     </a:solidFill>
@@ -12387,7 +12388,7 @@
               </a:ln>
               <a:extLst>
                 <a:ext uri="{91240B29-F687-4f45-9708-019B960494DF}">
-                  <a14:hiddenLine xmlns="" xmlns:a14="http://schemas.microsoft.com/office/drawing/2010/main" w="9525">
+                  <a14:hiddenLine xmlns:a14="http://schemas.microsoft.com/office/drawing/2010/main" xmlns="" w="9525">
                     <a:solidFill>
                       <a:srgbClr val="000000"/>
                     </a:solidFill>
@@ -12421,7 +12422,7 @@
               </a:ln>
               <a:extLst>
                 <a:ext uri="{91240B29-F687-4f45-9708-019B960494DF}">
-                  <a14:hiddenLine xmlns="" xmlns:a14="http://schemas.microsoft.com/office/drawing/2010/main" w="9525">
+                  <a14:hiddenLine xmlns:a14="http://schemas.microsoft.com/office/drawing/2010/main" xmlns="" w="9525">
                     <a:solidFill>
                       <a:srgbClr val="000000"/>
                     </a:solidFill>
@@ -15334,8 +15335,13 @@
           <a:p>
             <a:r>
               <a:rPr lang="es-CR" dirty="0"/>
-              <a:t>Videos de la Presentación y Demostración</a:t>
-            </a:r>
+              <a:t>Repositorio de </a:t>
+            </a:r>
+            <a:r>
+              <a:rPr lang="es-CR" dirty="0" err="1"/>
+              <a:t>Github</a:t>
+            </a:r>
+            <a:endParaRPr lang="es-CR" dirty="0"/>
           </a:p>
         </p:txBody>
       </p:sp>
@@ -15361,9 +15367,10 @@
           <a:lstStyle/>
           <a:p>
             <a:r>
-              <a:rPr lang="en-US" dirty="0"/>
-              <a:t>https://www.youtube.com/playlist?list=PL505ikS4_cz5VZ3eEmzFxl2bhVQydkjG0</a:t>
-            </a:r>
+              <a:rPr lang="en-US"/>
+              <a:t>https://github.com/ZiraelS/Presentacion_Pivot_Unpivot_Lookup</a:t>
+            </a:r>
+            <a:endParaRPr lang="en-US" dirty="0"/>
           </a:p>
         </p:txBody>
       </p:sp>
@@ -15371,6 +15378,92 @@
     <p:extLst>
       <p:ext uri="{BB962C8B-B14F-4D97-AF65-F5344CB8AC3E}">
         <p14:creationId xmlns:p14="http://schemas.microsoft.com/office/powerpoint/2010/main" val="3764402850"/>
+      </p:ext>
+    </p:extLst>
+  </p:cSld>
+  <p:clrMapOvr>
+    <a:masterClrMapping/>
+  </p:clrMapOvr>
+</p:sld>
+</file>
+
+<file path=ppt/slides/slide8.xml><?xml version="1.0" encoding="utf-8"?>
+<p:sld xmlns:a="http://schemas.openxmlformats.org/drawingml/2006/main" xmlns:r="http://schemas.openxmlformats.org/officeDocument/2006/relationships" xmlns:p="http://schemas.openxmlformats.org/presentationml/2006/main">
+  <p:cSld>
+    <p:spTree>
+      <p:nvGrpSpPr>
+        <p:cNvPr id="1" name=""/>
+        <p:cNvGrpSpPr/>
+        <p:nvPr/>
+      </p:nvGrpSpPr>
+      <p:grpSpPr>
+        <a:xfrm>
+          <a:off x="0" y="0"/>
+          <a:ext cx="0" cy="0"/>
+          <a:chOff x="0" y="0"/>
+          <a:chExt cx="0" cy="0"/>
+        </a:xfrm>
+      </p:grpSpPr>
+      <p:sp>
+        <p:nvSpPr>
+          <p:cNvPr id="2" name="Title 1">
+            <a:extLst>
+              <a:ext uri="{FF2B5EF4-FFF2-40B4-BE49-F238E27FC236}">
+                <a16:creationId xmlns:a16="http://schemas.microsoft.com/office/drawing/2014/main" id="{B2BD7A27-137F-4211-BA63-03A52BDBF17A}"/>
+              </a:ext>
+            </a:extLst>
+          </p:cNvPr>
+          <p:cNvSpPr>
+            <a:spLocks noGrp="1"/>
+          </p:cNvSpPr>
+          <p:nvPr>
+            <p:ph type="title"/>
+          </p:nvPr>
+        </p:nvSpPr>
+        <p:spPr/>
+        <p:txBody>
+          <a:bodyPr/>
+          <a:lstStyle/>
+          <a:p>
+            <a:r>
+              <a:rPr lang="es-CR" dirty="0"/>
+              <a:t>Videos de la Presentación y Demostración</a:t>
+            </a:r>
+          </a:p>
+        </p:txBody>
+      </p:sp>
+      <p:sp>
+        <p:nvSpPr>
+          <p:cNvPr id="3" name="Content Placeholder 2">
+            <a:extLst>
+              <a:ext uri="{FF2B5EF4-FFF2-40B4-BE49-F238E27FC236}">
+                <a16:creationId xmlns:a16="http://schemas.microsoft.com/office/drawing/2014/main" id="{B50CF5A5-9AEC-4EF0-8D74-66E7F98279F2}"/>
+              </a:ext>
+            </a:extLst>
+          </p:cNvPr>
+          <p:cNvSpPr>
+            <a:spLocks noGrp="1"/>
+          </p:cNvSpPr>
+          <p:nvPr>
+            <p:ph idx="1"/>
+          </p:nvPr>
+        </p:nvSpPr>
+        <p:spPr/>
+        <p:txBody>
+          <a:bodyPr/>
+          <a:lstStyle/>
+          <a:p>
+            <a:r>
+              <a:rPr lang="en-US" dirty="0"/>
+              <a:t>https://www.youtube.com/playlist?list=PL505ikS4_cz5VZ3eEmzFxl2bhVQydkjG0</a:t>
+            </a:r>
+          </a:p>
+        </p:txBody>
+      </p:sp>
+    </p:spTree>
+    <p:extLst>
+      <p:ext uri="{BB962C8B-B14F-4D97-AF65-F5344CB8AC3E}">
+        <p14:creationId xmlns:p14="http://schemas.microsoft.com/office/powerpoint/2010/main" val="3564264304"/>
       </p:ext>
     </p:extLst>
   </p:cSld>

</xml_diff>